<commit_message>
Started working on regression/feat selection
</commit_message>
<xml_diff>
--- a/Resources/GraphicalResources/Presentation1.pptx
+++ b/Resources/GraphicalResources/Presentation1.pptx
@@ -245,7 +245,7 @@
           <a:p>
             <a:fld id="{52674EDA-D5F0-4BA8-BCF8-E774905099E5}" type="datetimeFigureOut">
               <a:rPr lang="en-US" smtClean="0"/>
-              <a:t>11/18/2019</a:t>
+              <a:t>12/6/2019</a:t>
             </a:fld>
             <a:endParaRPr lang="en-US"/>
           </a:p>
@@ -413,7 +413,7 @@
           <a:p>
             <a:fld id="{52674EDA-D5F0-4BA8-BCF8-E774905099E5}" type="datetimeFigureOut">
               <a:rPr lang="en-US" smtClean="0"/>
-              <a:t>11/18/2019</a:t>
+              <a:t>12/6/2019</a:t>
             </a:fld>
             <a:endParaRPr lang="en-US"/>
           </a:p>
@@ -591,7 +591,7 @@
           <a:p>
             <a:fld id="{52674EDA-D5F0-4BA8-BCF8-E774905099E5}" type="datetimeFigureOut">
               <a:rPr lang="en-US" smtClean="0"/>
-              <a:t>11/18/2019</a:t>
+              <a:t>12/6/2019</a:t>
             </a:fld>
             <a:endParaRPr lang="en-US"/>
           </a:p>
@@ -759,7 +759,7 @@
           <a:p>
             <a:fld id="{52674EDA-D5F0-4BA8-BCF8-E774905099E5}" type="datetimeFigureOut">
               <a:rPr lang="en-US" smtClean="0"/>
-              <a:t>11/18/2019</a:t>
+              <a:t>12/6/2019</a:t>
             </a:fld>
             <a:endParaRPr lang="en-US"/>
           </a:p>
@@ -1004,7 +1004,7 @@
           <a:p>
             <a:fld id="{52674EDA-D5F0-4BA8-BCF8-E774905099E5}" type="datetimeFigureOut">
               <a:rPr lang="en-US" smtClean="0"/>
-              <a:t>11/18/2019</a:t>
+              <a:t>12/6/2019</a:t>
             </a:fld>
             <a:endParaRPr lang="en-US"/>
           </a:p>
@@ -1233,7 +1233,7 @@
           <a:p>
             <a:fld id="{52674EDA-D5F0-4BA8-BCF8-E774905099E5}" type="datetimeFigureOut">
               <a:rPr lang="en-US" smtClean="0"/>
-              <a:t>11/18/2019</a:t>
+              <a:t>12/6/2019</a:t>
             </a:fld>
             <a:endParaRPr lang="en-US"/>
           </a:p>
@@ -1597,7 +1597,7 @@
           <a:p>
             <a:fld id="{52674EDA-D5F0-4BA8-BCF8-E774905099E5}" type="datetimeFigureOut">
               <a:rPr lang="en-US" smtClean="0"/>
-              <a:t>11/18/2019</a:t>
+              <a:t>12/6/2019</a:t>
             </a:fld>
             <a:endParaRPr lang="en-US"/>
           </a:p>
@@ -1714,7 +1714,7 @@
           <a:p>
             <a:fld id="{52674EDA-D5F0-4BA8-BCF8-E774905099E5}" type="datetimeFigureOut">
               <a:rPr lang="en-US" smtClean="0"/>
-              <a:t>11/18/2019</a:t>
+              <a:t>12/6/2019</a:t>
             </a:fld>
             <a:endParaRPr lang="en-US"/>
           </a:p>
@@ -1809,7 +1809,7 @@
           <a:p>
             <a:fld id="{52674EDA-D5F0-4BA8-BCF8-E774905099E5}" type="datetimeFigureOut">
               <a:rPr lang="en-US" smtClean="0"/>
-              <a:t>11/18/2019</a:t>
+              <a:t>12/6/2019</a:t>
             </a:fld>
             <a:endParaRPr lang="en-US"/>
           </a:p>
@@ -2084,7 +2084,7 @@
           <a:p>
             <a:fld id="{52674EDA-D5F0-4BA8-BCF8-E774905099E5}" type="datetimeFigureOut">
               <a:rPr lang="en-US" smtClean="0"/>
-              <a:t>11/18/2019</a:t>
+              <a:t>12/6/2019</a:t>
             </a:fld>
             <a:endParaRPr lang="en-US"/>
           </a:p>
@@ -2336,7 +2336,7 @@
           <a:p>
             <a:fld id="{52674EDA-D5F0-4BA8-BCF8-E774905099E5}" type="datetimeFigureOut">
               <a:rPr lang="en-US" smtClean="0"/>
-              <a:t>11/18/2019</a:t>
+              <a:t>12/6/2019</a:t>
             </a:fld>
             <a:endParaRPr lang="en-US"/>
           </a:p>
@@ -2547,7 +2547,7 @@
           <a:p>
             <a:fld id="{52674EDA-D5F0-4BA8-BCF8-E774905099E5}" type="datetimeFigureOut">
               <a:rPr lang="en-US" smtClean="0"/>
-              <a:t>11/18/2019</a:t>
+              <a:t>12/6/2019</a:t>
             </a:fld>
             <a:endParaRPr lang="en-US"/>
           </a:p>
@@ -16401,9 +16401,9 @@
         <p:grpSpPr>
           <a:xfrm>
             <a:off x="7525017" y="3541086"/>
-            <a:ext cx="1613323" cy="1075616"/>
+            <a:ext cx="1613323" cy="1073303"/>
             <a:chOff x="7525017" y="3541086"/>
-            <a:chExt cx="1613323" cy="1075616"/>
+            <a:chExt cx="1613323" cy="1073303"/>
           </a:xfrm>
         </p:grpSpPr>
         <p:sp>
@@ -16420,7 +16420,7 @@
           </p:nvSpPr>
           <p:spPr>
             <a:xfrm flipV="1">
-              <a:off x="7525017" y="4073918"/>
+              <a:off x="7525017" y="4071605"/>
               <a:ext cx="1606526" cy="542784"/>
             </a:xfrm>
             <a:custGeom>
@@ -16518,7 +16518,7 @@
             <a:lstStyle/>
             <a:p>
               <a:pPr algn="ctr"/>
-              <a:endParaRPr lang="en-US"/>
+              <a:endParaRPr lang="en-US" dirty="0"/>
             </a:p>
           </p:txBody>
         </p:sp>
@@ -19389,8 +19389,10 @@
             <a:solidFill>
               <a:srgbClr val="003E51"/>
             </a:solidFill>
-            <a:ln w="152400" cap="rnd">
-              <a:noFill/>
+            <a:ln w="12700" cap="rnd">
+              <a:solidFill>
+                <a:srgbClr val="003E51"/>
+              </a:solidFill>
               <a:round/>
             </a:ln>
           </p:spPr>
@@ -19442,8 +19444,10 @@
             <a:solidFill>
               <a:srgbClr val="007396"/>
             </a:solidFill>
-            <a:ln w="152400" cap="rnd">
-              <a:noFill/>
+            <a:ln w="12700" cap="rnd">
+              <a:solidFill>
+                <a:srgbClr val="003E51"/>
+              </a:solidFill>
               <a:round/>
             </a:ln>
           </p:spPr>
@@ -19493,10 +19497,12 @@
               <a:avLst/>
             </a:prstGeom>
             <a:solidFill>
-              <a:srgbClr val="9A3324"/>
+              <a:srgbClr val="CA9117"/>
             </a:solidFill>
-            <a:ln w="152400" cap="rnd">
-              <a:noFill/>
+            <a:ln w="12700" cap="rnd">
+              <a:solidFill>
+                <a:srgbClr val="003E51"/>
+              </a:solidFill>
               <a:round/>
             </a:ln>
           </p:spPr>
@@ -19546,10 +19552,12 @@
               <a:avLst/>
             </a:prstGeom>
             <a:solidFill>
-              <a:srgbClr val="CA9117"/>
+              <a:srgbClr val="CFBD2D"/>
             </a:solidFill>
-            <a:ln w="152400" cap="rnd">
-              <a:noFill/>
+            <a:ln w="12700" cap="rnd">
+              <a:solidFill>
+                <a:srgbClr val="003E51"/>
+              </a:solidFill>
               <a:round/>
             </a:ln>
           </p:spPr>

</xml_diff>

<commit_message>
graph performance, web map, configure tab
</commit_message>
<xml_diff>
--- a/Resources/GraphicalResources/Presentation1.pptx
+++ b/Resources/GraphicalResources/Presentation1.pptx
@@ -245,7 +245,7 @@
           <a:p>
             <a:fld id="{52674EDA-D5F0-4BA8-BCF8-E774905099E5}" type="datetimeFigureOut">
               <a:rPr lang="en-US" smtClean="0"/>
-              <a:t>3/17/2020</a:t>
+              <a:t>4/23/2020</a:t>
             </a:fld>
             <a:endParaRPr lang="en-US"/>
           </a:p>
@@ -413,7 +413,7 @@
           <a:p>
             <a:fld id="{52674EDA-D5F0-4BA8-BCF8-E774905099E5}" type="datetimeFigureOut">
               <a:rPr lang="en-US" smtClean="0"/>
-              <a:t>3/17/2020</a:t>
+              <a:t>4/23/2020</a:t>
             </a:fld>
             <a:endParaRPr lang="en-US"/>
           </a:p>
@@ -591,7 +591,7 @@
           <a:p>
             <a:fld id="{52674EDA-D5F0-4BA8-BCF8-E774905099E5}" type="datetimeFigureOut">
               <a:rPr lang="en-US" smtClean="0"/>
-              <a:t>3/17/2020</a:t>
+              <a:t>4/23/2020</a:t>
             </a:fld>
             <a:endParaRPr lang="en-US"/>
           </a:p>
@@ -759,7 +759,7 @@
           <a:p>
             <a:fld id="{52674EDA-D5F0-4BA8-BCF8-E774905099E5}" type="datetimeFigureOut">
               <a:rPr lang="en-US" smtClean="0"/>
-              <a:t>3/17/2020</a:t>
+              <a:t>4/23/2020</a:t>
             </a:fld>
             <a:endParaRPr lang="en-US"/>
           </a:p>
@@ -1004,7 +1004,7 @@
           <a:p>
             <a:fld id="{52674EDA-D5F0-4BA8-BCF8-E774905099E5}" type="datetimeFigureOut">
               <a:rPr lang="en-US" smtClean="0"/>
-              <a:t>3/17/2020</a:t>
+              <a:t>4/23/2020</a:t>
             </a:fld>
             <a:endParaRPr lang="en-US"/>
           </a:p>
@@ -1233,7 +1233,7 @@
           <a:p>
             <a:fld id="{52674EDA-D5F0-4BA8-BCF8-E774905099E5}" type="datetimeFigureOut">
               <a:rPr lang="en-US" smtClean="0"/>
-              <a:t>3/17/2020</a:t>
+              <a:t>4/23/2020</a:t>
             </a:fld>
             <a:endParaRPr lang="en-US"/>
           </a:p>
@@ -1597,7 +1597,7 @@
           <a:p>
             <a:fld id="{52674EDA-D5F0-4BA8-BCF8-E774905099E5}" type="datetimeFigureOut">
               <a:rPr lang="en-US" smtClean="0"/>
-              <a:t>3/17/2020</a:t>
+              <a:t>4/23/2020</a:t>
             </a:fld>
             <a:endParaRPr lang="en-US"/>
           </a:p>
@@ -1714,7 +1714,7 @@
           <a:p>
             <a:fld id="{52674EDA-D5F0-4BA8-BCF8-E774905099E5}" type="datetimeFigureOut">
               <a:rPr lang="en-US" smtClean="0"/>
-              <a:t>3/17/2020</a:t>
+              <a:t>4/23/2020</a:t>
             </a:fld>
             <a:endParaRPr lang="en-US"/>
           </a:p>
@@ -1809,7 +1809,7 @@
           <a:p>
             <a:fld id="{52674EDA-D5F0-4BA8-BCF8-E774905099E5}" type="datetimeFigureOut">
               <a:rPr lang="en-US" smtClean="0"/>
-              <a:t>3/17/2020</a:t>
+              <a:t>4/23/2020</a:t>
             </a:fld>
             <a:endParaRPr lang="en-US"/>
           </a:p>
@@ -2084,7 +2084,7 @@
           <a:p>
             <a:fld id="{52674EDA-D5F0-4BA8-BCF8-E774905099E5}" type="datetimeFigureOut">
               <a:rPr lang="en-US" smtClean="0"/>
-              <a:t>3/17/2020</a:t>
+              <a:t>4/23/2020</a:t>
             </a:fld>
             <a:endParaRPr lang="en-US"/>
           </a:p>
@@ -2336,7 +2336,7 @@
           <a:p>
             <a:fld id="{52674EDA-D5F0-4BA8-BCF8-E774905099E5}" type="datetimeFigureOut">
               <a:rPr lang="en-US" smtClean="0"/>
-              <a:t>3/17/2020</a:t>
+              <a:t>4/23/2020</a:t>
             </a:fld>
             <a:endParaRPr lang="en-US"/>
           </a:p>
@@ -2547,7 +2547,7 @@
           <a:p>
             <a:fld id="{52674EDA-D5F0-4BA8-BCF8-E774905099E5}" type="datetimeFigureOut">
               <a:rPr lang="en-US" smtClean="0"/>
-              <a:t>3/17/2020</a:t>
+              <a:t>4/23/2020</a:t>
             </a:fld>
             <a:endParaRPr lang="en-US"/>
           </a:p>
@@ -15758,7 +15758,7 @@
         </p:nvGrpSpPr>
         <p:grpSpPr>
           <a:xfrm>
-            <a:off x="4655050" y="3813289"/>
+            <a:off x="3718934" y="3782235"/>
             <a:ext cx="1440950" cy="1242198"/>
             <a:chOff x="3744506" y="3749789"/>
             <a:chExt cx="1440950" cy="1242198"/>
@@ -16259,6 +16259,611 @@
             <a:p>
               <a:pPr algn="ctr"/>
               <a:endParaRPr lang="en-US"/>
+            </a:p>
+          </p:txBody>
+        </p:sp>
+      </p:grpSp>
+      <p:grpSp>
+        <p:nvGrpSpPr>
+          <p:cNvPr id="3" name="Group 2">
+            <a:extLst>
+              <a:ext uri="{FF2B5EF4-FFF2-40B4-BE49-F238E27FC236}">
+                <a16:creationId xmlns:a16="http://schemas.microsoft.com/office/drawing/2014/main" id="{CD1D4D98-2761-4AD5-953E-93FA3C2BD5E6}"/>
+              </a:ext>
+            </a:extLst>
+          </p:cNvPr>
+          <p:cNvGrpSpPr/>
+          <p:nvPr/>
+        </p:nvGrpSpPr>
+        <p:grpSpPr>
+          <a:xfrm>
+            <a:off x="1686517" y="4567744"/>
+            <a:ext cx="1355263" cy="1242198"/>
+            <a:chOff x="1686517" y="4567744"/>
+            <a:chExt cx="1528474" cy="1242198"/>
+          </a:xfrm>
+        </p:grpSpPr>
+        <p:grpSp>
+          <p:nvGrpSpPr>
+            <p:cNvPr id="33" name="Group 32">
+              <a:extLst>
+                <a:ext uri="{FF2B5EF4-FFF2-40B4-BE49-F238E27FC236}">
+                  <a16:creationId xmlns:a16="http://schemas.microsoft.com/office/drawing/2014/main" id="{0B7E275E-DD51-4F5D-841D-D0298B7EAFAD}"/>
+                </a:ext>
+              </a:extLst>
+            </p:cNvPr>
+            <p:cNvGrpSpPr/>
+            <p:nvPr/>
+          </p:nvGrpSpPr>
+          <p:grpSpPr>
+            <a:xfrm>
+              <a:off x="1774041" y="4567744"/>
+              <a:ext cx="1440950" cy="1242198"/>
+              <a:chOff x="3744506" y="3749789"/>
+              <a:chExt cx="1440950" cy="1242198"/>
+            </a:xfrm>
+          </p:grpSpPr>
+          <p:sp>
+            <p:nvSpPr>
+              <p:cNvPr id="34" name="Isosceles Triangle 33">
+                <a:extLst>
+                  <a:ext uri="{FF2B5EF4-FFF2-40B4-BE49-F238E27FC236}">
+                    <a16:creationId xmlns:a16="http://schemas.microsoft.com/office/drawing/2014/main" id="{AA18C361-D973-4B34-8D06-B50899D78E66}"/>
+                  </a:ext>
+                </a:extLst>
+              </p:cNvPr>
+              <p:cNvSpPr/>
+              <p:nvPr/>
+            </p:nvSpPr>
+            <p:spPr>
+              <a:xfrm>
+                <a:off x="3744506" y="3749789"/>
+                <a:ext cx="1440950" cy="1242198"/>
+              </a:xfrm>
+              <a:prstGeom prst="triangle">
+                <a:avLst/>
+              </a:prstGeom>
+              <a:noFill/>
+              <a:ln w="152400">
+                <a:noFill/>
+              </a:ln>
+            </p:spPr>
+            <p:style>
+              <a:lnRef idx="2">
+                <a:schemeClr val="accent1">
+                  <a:shade val="50000"/>
+                </a:schemeClr>
+              </a:lnRef>
+              <a:fillRef idx="1">
+                <a:schemeClr val="accent1"/>
+              </a:fillRef>
+              <a:effectRef idx="0">
+                <a:schemeClr val="accent1"/>
+              </a:effectRef>
+              <a:fontRef idx="minor">
+                <a:schemeClr val="lt1"/>
+              </a:fontRef>
+            </p:style>
+            <p:txBody>
+              <a:bodyPr rtlCol="0" anchor="ctr"/>
+              <a:lstStyle/>
+              <a:p>
+                <a:pPr algn="ctr"/>
+                <a:endParaRPr lang="en-US"/>
+              </a:p>
+            </p:txBody>
+          </p:sp>
+          <p:sp>
+            <p:nvSpPr>
+              <p:cNvPr id="41" name="Isosceles Triangle 40">
+                <a:extLst>
+                  <a:ext uri="{FF2B5EF4-FFF2-40B4-BE49-F238E27FC236}">
+                    <a16:creationId xmlns:a16="http://schemas.microsoft.com/office/drawing/2014/main" id="{44B83A6E-EEB3-48C9-B6DC-E7CE9997EF53}"/>
+                  </a:ext>
+                </a:extLst>
+              </p:cNvPr>
+              <p:cNvSpPr/>
+              <p:nvPr/>
+            </p:nvSpPr>
+            <p:spPr>
+              <a:xfrm>
+                <a:off x="3803109" y="3821620"/>
+                <a:ext cx="1327890" cy="1144733"/>
+              </a:xfrm>
+              <a:prstGeom prst="triangle">
+                <a:avLst/>
+              </a:prstGeom>
+              <a:solidFill>
+                <a:srgbClr val="007396"/>
+              </a:solidFill>
+              <a:ln w="101600">
+                <a:solidFill>
+                  <a:srgbClr val="003E51"/>
+                </a:solidFill>
+              </a:ln>
+            </p:spPr>
+            <p:style>
+              <a:lnRef idx="2">
+                <a:schemeClr val="accent1">
+                  <a:shade val="50000"/>
+                </a:schemeClr>
+              </a:lnRef>
+              <a:fillRef idx="1">
+                <a:schemeClr val="accent1"/>
+              </a:fillRef>
+              <a:effectRef idx="0">
+                <a:schemeClr val="accent1"/>
+              </a:effectRef>
+              <a:fontRef idx="minor">
+                <a:schemeClr val="lt1"/>
+              </a:fontRef>
+            </p:style>
+            <p:txBody>
+              <a:bodyPr rtlCol="0" anchor="ctr"/>
+              <a:lstStyle/>
+              <a:p>
+                <a:pPr algn="ctr"/>
+                <a:endParaRPr lang="en-US"/>
+              </a:p>
+            </p:txBody>
+          </p:sp>
+          <p:sp>
+            <p:nvSpPr>
+              <p:cNvPr id="43" name="Isosceles Triangle 42">
+                <a:extLst>
+                  <a:ext uri="{FF2B5EF4-FFF2-40B4-BE49-F238E27FC236}">
+                    <a16:creationId xmlns:a16="http://schemas.microsoft.com/office/drawing/2014/main" id="{DAE62C6D-58F2-42FD-A125-1A15C9D2955A}"/>
+                  </a:ext>
+                </a:extLst>
+              </p:cNvPr>
+              <p:cNvSpPr/>
+              <p:nvPr/>
+            </p:nvSpPr>
+            <p:spPr>
+              <a:xfrm>
+                <a:off x="4464981" y="3821620"/>
+                <a:ext cx="666018" cy="1163273"/>
+              </a:xfrm>
+              <a:prstGeom prst="triangle">
+                <a:avLst>
+                  <a:gd name="adj" fmla="val 0"/>
+                </a:avLst>
+              </a:prstGeom>
+              <a:solidFill>
+                <a:srgbClr val="003E51"/>
+              </a:solidFill>
+              <a:ln w="76200">
+                <a:noFill/>
+              </a:ln>
+            </p:spPr>
+            <p:style>
+              <a:lnRef idx="2">
+                <a:schemeClr val="accent1">
+                  <a:shade val="50000"/>
+                </a:schemeClr>
+              </a:lnRef>
+              <a:fillRef idx="1">
+                <a:schemeClr val="accent1"/>
+              </a:fillRef>
+              <a:effectRef idx="0">
+                <a:schemeClr val="accent1"/>
+              </a:effectRef>
+              <a:fontRef idx="minor">
+                <a:schemeClr val="lt1"/>
+              </a:fontRef>
+            </p:style>
+            <p:txBody>
+              <a:bodyPr rtlCol="0" anchor="ctr"/>
+              <a:lstStyle/>
+              <a:p>
+                <a:pPr algn="ctr"/>
+                <a:endParaRPr lang="en-US"/>
+              </a:p>
+            </p:txBody>
+          </p:sp>
+          <p:grpSp>
+            <p:nvGrpSpPr>
+              <p:cNvPr id="44" name="Group 43">
+                <a:extLst>
+                  <a:ext uri="{FF2B5EF4-FFF2-40B4-BE49-F238E27FC236}">
+                    <a16:creationId xmlns:a16="http://schemas.microsoft.com/office/drawing/2014/main" id="{65C01CF2-381B-472F-B30D-993B9DF82783}"/>
+                  </a:ext>
+                </a:extLst>
+              </p:cNvPr>
+              <p:cNvGrpSpPr/>
+              <p:nvPr/>
+            </p:nvGrpSpPr>
+            <p:grpSpPr>
+              <a:xfrm>
+                <a:off x="4218751" y="3929482"/>
+                <a:ext cx="500917" cy="652043"/>
+                <a:chOff x="6943450" y="743459"/>
+                <a:chExt cx="1055694" cy="1374197"/>
+              </a:xfrm>
+              <a:solidFill>
+                <a:srgbClr val="FFFFFF"/>
+              </a:solidFill>
+            </p:grpSpPr>
+            <p:sp>
+              <p:nvSpPr>
+                <p:cNvPr id="46" name="Isosceles Triangle 45">
+                  <a:extLst>
+                    <a:ext uri="{FF2B5EF4-FFF2-40B4-BE49-F238E27FC236}">
+                      <a16:creationId xmlns:a16="http://schemas.microsoft.com/office/drawing/2014/main" id="{BBCA5DC8-EE90-413E-B4F5-88133F31FA14}"/>
+                    </a:ext>
+                  </a:extLst>
+                </p:cNvPr>
+                <p:cNvSpPr/>
+                <p:nvPr/>
+              </p:nvSpPr>
+              <p:spPr>
+                <a:xfrm>
+                  <a:off x="6943450" y="743459"/>
+                  <a:ext cx="1055694" cy="910081"/>
+                </a:xfrm>
+                <a:prstGeom prst="triangle">
+                  <a:avLst/>
+                </a:prstGeom>
+                <a:grpFill/>
+                <a:ln>
+                  <a:noFill/>
+                </a:ln>
+              </p:spPr>
+              <p:style>
+                <a:lnRef idx="2">
+                  <a:schemeClr val="accent1">
+                    <a:shade val="50000"/>
+                  </a:schemeClr>
+                </a:lnRef>
+                <a:fillRef idx="1">
+                  <a:schemeClr val="accent1"/>
+                </a:fillRef>
+                <a:effectRef idx="0">
+                  <a:schemeClr val="accent1"/>
+                </a:effectRef>
+                <a:fontRef idx="minor">
+                  <a:schemeClr val="lt1"/>
+                </a:fontRef>
+              </p:style>
+              <p:txBody>
+                <a:bodyPr rtlCol="0" anchor="ctr"/>
+                <a:lstStyle/>
+                <a:p>
+                  <a:pPr algn="ctr"/>
+                  <a:endParaRPr lang="en-US"/>
+                </a:p>
+              </p:txBody>
+            </p:sp>
+            <p:sp>
+              <p:nvSpPr>
+                <p:cNvPr id="47" name="Isosceles Triangle 46">
+                  <a:extLst>
+                    <a:ext uri="{FF2B5EF4-FFF2-40B4-BE49-F238E27FC236}">
+                      <a16:creationId xmlns:a16="http://schemas.microsoft.com/office/drawing/2014/main" id="{52CD6C6A-E4FC-43D4-8BDC-D84F12F2F0D1}"/>
+                    </a:ext>
+                  </a:extLst>
+                </p:cNvPr>
+                <p:cNvSpPr/>
+                <p:nvPr/>
+              </p:nvSpPr>
+              <p:spPr>
+                <a:xfrm rot="10800000">
+                  <a:off x="6943450" y="1647527"/>
+                  <a:ext cx="428576" cy="369462"/>
+                </a:xfrm>
+                <a:prstGeom prst="triangle">
+                  <a:avLst>
+                    <a:gd name="adj" fmla="val 96486"/>
+                  </a:avLst>
+                </a:prstGeom>
+                <a:grpFill/>
+                <a:ln>
+                  <a:noFill/>
+                </a:ln>
+              </p:spPr>
+              <p:style>
+                <a:lnRef idx="2">
+                  <a:schemeClr val="accent1">
+                    <a:shade val="50000"/>
+                  </a:schemeClr>
+                </a:lnRef>
+                <a:fillRef idx="1">
+                  <a:schemeClr val="accent1"/>
+                </a:fillRef>
+                <a:effectRef idx="0">
+                  <a:schemeClr val="accent1"/>
+                </a:effectRef>
+                <a:fontRef idx="minor">
+                  <a:schemeClr val="lt1"/>
+                </a:fontRef>
+              </p:style>
+              <p:txBody>
+                <a:bodyPr rtlCol="0" anchor="ctr"/>
+                <a:lstStyle/>
+                <a:p>
+                  <a:pPr algn="ctr"/>
+                  <a:endParaRPr lang="en-US"/>
+                </a:p>
+              </p:txBody>
+            </p:sp>
+            <p:sp>
+              <p:nvSpPr>
+                <p:cNvPr id="50" name="Isosceles Triangle 49">
+                  <a:extLst>
+                    <a:ext uri="{FF2B5EF4-FFF2-40B4-BE49-F238E27FC236}">
+                      <a16:creationId xmlns:a16="http://schemas.microsoft.com/office/drawing/2014/main" id="{B23530B1-F7E5-4290-AE2D-D09459A742A3}"/>
+                    </a:ext>
+                  </a:extLst>
+                </p:cNvPr>
+                <p:cNvSpPr/>
+                <p:nvPr/>
+              </p:nvSpPr>
+              <p:spPr>
+                <a:xfrm rot="10800000">
+                  <a:off x="7129536" y="1647527"/>
+                  <a:ext cx="428576" cy="470129"/>
+                </a:xfrm>
+                <a:prstGeom prst="triangle">
+                  <a:avLst>
+                    <a:gd name="adj" fmla="val 64680"/>
+                  </a:avLst>
+                </a:prstGeom>
+                <a:grpFill/>
+                <a:ln>
+                  <a:noFill/>
+                </a:ln>
+              </p:spPr>
+              <p:style>
+                <a:lnRef idx="2">
+                  <a:schemeClr val="accent1">
+                    <a:shade val="50000"/>
+                  </a:schemeClr>
+                </a:lnRef>
+                <a:fillRef idx="1">
+                  <a:schemeClr val="accent1"/>
+                </a:fillRef>
+                <a:effectRef idx="0">
+                  <a:schemeClr val="accent1"/>
+                </a:effectRef>
+                <a:fontRef idx="minor">
+                  <a:schemeClr val="lt1"/>
+                </a:fontRef>
+              </p:style>
+              <p:txBody>
+                <a:bodyPr rtlCol="0" anchor="ctr"/>
+                <a:lstStyle/>
+                <a:p>
+                  <a:pPr algn="ctr"/>
+                  <a:endParaRPr lang="en-US"/>
+                </a:p>
+              </p:txBody>
+            </p:sp>
+            <p:sp>
+              <p:nvSpPr>
+                <p:cNvPr id="52" name="Isosceles Triangle 51">
+                  <a:extLst>
+                    <a:ext uri="{FF2B5EF4-FFF2-40B4-BE49-F238E27FC236}">
+                      <a16:creationId xmlns:a16="http://schemas.microsoft.com/office/drawing/2014/main" id="{6BC1268B-8F1D-4D38-B9C5-815713870798}"/>
+                    </a:ext>
+                  </a:extLst>
+                </p:cNvPr>
+                <p:cNvSpPr/>
+                <p:nvPr/>
+              </p:nvSpPr>
+              <p:spPr>
+                <a:xfrm rot="10800000">
+                  <a:off x="7353968" y="1647527"/>
+                  <a:ext cx="428576" cy="470129"/>
+                </a:xfrm>
+                <a:prstGeom prst="triangle">
+                  <a:avLst>
+                    <a:gd name="adj" fmla="val 30427"/>
+                  </a:avLst>
+                </a:prstGeom>
+                <a:grpFill/>
+                <a:ln>
+                  <a:noFill/>
+                </a:ln>
+              </p:spPr>
+              <p:style>
+                <a:lnRef idx="2">
+                  <a:schemeClr val="accent1">
+                    <a:shade val="50000"/>
+                  </a:schemeClr>
+                </a:lnRef>
+                <a:fillRef idx="1">
+                  <a:schemeClr val="accent1"/>
+                </a:fillRef>
+                <a:effectRef idx="0">
+                  <a:schemeClr val="accent1"/>
+                </a:effectRef>
+                <a:fontRef idx="minor">
+                  <a:schemeClr val="lt1"/>
+                </a:fontRef>
+              </p:style>
+              <p:txBody>
+                <a:bodyPr rtlCol="0" anchor="ctr"/>
+                <a:lstStyle/>
+                <a:p>
+                  <a:pPr algn="ctr"/>
+                  <a:endParaRPr lang="en-US"/>
+                </a:p>
+              </p:txBody>
+            </p:sp>
+            <p:sp>
+              <p:nvSpPr>
+                <p:cNvPr id="54" name="Isosceles Triangle 53">
+                  <a:extLst>
+                    <a:ext uri="{FF2B5EF4-FFF2-40B4-BE49-F238E27FC236}">
+                      <a16:creationId xmlns:a16="http://schemas.microsoft.com/office/drawing/2014/main" id="{461386FA-A68C-4455-B3B8-1C4FAB29D823}"/>
+                    </a:ext>
+                  </a:extLst>
+                </p:cNvPr>
+                <p:cNvSpPr/>
+                <p:nvPr/>
+              </p:nvSpPr>
+              <p:spPr>
+                <a:xfrm rot="10800000">
+                  <a:off x="7564559" y="1647527"/>
+                  <a:ext cx="428576" cy="369462"/>
+                </a:xfrm>
+                <a:prstGeom prst="triangle">
+                  <a:avLst>
+                    <a:gd name="adj" fmla="val 0"/>
+                  </a:avLst>
+                </a:prstGeom>
+                <a:grpFill/>
+                <a:ln>
+                  <a:noFill/>
+                </a:ln>
+              </p:spPr>
+              <p:style>
+                <a:lnRef idx="2">
+                  <a:schemeClr val="accent1">
+                    <a:shade val="50000"/>
+                  </a:schemeClr>
+                </a:lnRef>
+                <a:fillRef idx="1">
+                  <a:schemeClr val="accent1"/>
+                </a:fillRef>
+                <a:effectRef idx="0">
+                  <a:schemeClr val="accent1"/>
+                </a:effectRef>
+                <a:fontRef idx="minor">
+                  <a:schemeClr val="lt1"/>
+                </a:fontRef>
+              </p:style>
+              <p:txBody>
+                <a:bodyPr rtlCol="0" anchor="ctr"/>
+                <a:lstStyle/>
+                <a:p>
+                  <a:pPr algn="ctr"/>
+                  <a:endParaRPr lang="en-US" dirty="0"/>
+                </a:p>
+              </p:txBody>
+            </p:sp>
+          </p:grpSp>
+          <p:sp>
+            <p:nvSpPr>
+              <p:cNvPr id="45" name="Isosceles Triangle 44">
+                <a:extLst>
+                  <a:ext uri="{FF2B5EF4-FFF2-40B4-BE49-F238E27FC236}">
+                    <a16:creationId xmlns:a16="http://schemas.microsoft.com/office/drawing/2014/main" id="{20842484-8B9D-4230-9CE8-94D6D970D624}"/>
+                  </a:ext>
+                </a:extLst>
+              </p:cNvPr>
+              <p:cNvSpPr/>
+              <p:nvPr/>
+            </p:nvSpPr>
+            <p:spPr>
+              <a:xfrm>
+                <a:off x="4468629" y="3789252"/>
+                <a:ext cx="666018" cy="1163273"/>
+              </a:xfrm>
+              <a:prstGeom prst="triangle">
+                <a:avLst>
+                  <a:gd name="adj" fmla="val 0"/>
+                </a:avLst>
+              </a:prstGeom>
+              <a:solidFill>
+                <a:srgbClr val="003E51">
+                  <a:alpha val="27059"/>
+                </a:srgbClr>
+              </a:solidFill>
+              <a:ln w="76200">
+                <a:noFill/>
+              </a:ln>
+            </p:spPr>
+            <p:style>
+              <a:lnRef idx="2">
+                <a:schemeClr val="accent1">
+                  <a:shade val="50000"/>
+                </a:schemeClr>
+              </a:lnRef>
+              <a:fillRef idx="1">
+                <a:schemeClr val="accent1"/>
+              </a:fillRef>
+              <a:effectRef idx="0">
+                <a:schemeClr val="accent1"/>
+              </a:effectRef>
+              <a:fontRef idx="minor">
+                <a:schemeClr val="lt1"/>
+              </a:fontRef>
+            </p:style>
+            <p:txBody>
+              <a:bodyPr rtlCol="0" anchor="ctr"/>
+              <a:lstStyle/>
+              <a:p>
+                <a:pPr algn="ctr"/>
+                <a:endParaRPr lang="en-US"/>
+              </a:p>
+            </p:txBody>
+          </p:sp>
+        </p:grpSp>
+        <p:sp>
+          <p:nvSpPr>
+            <p:cNvPr id="55" name="Rectangle 54">
+              <a:extLst>
+                <a:ext uri="{FF2B5EF4-FFF2-40B4-BE49-F238E27FC236}">
+                  <a16:creationId xmlns:a16="http://schemas.microsoft.com/office/drawing/2014/main" id="{6404E1D1-8079-461F-97C6-F739EF0CDA85}"/>
+                </a:ext>
+              </a:extLst>
+            </p:cNvPr>
+            <p:cNvSpPr/>
+            <p:nvPr/>
+          </p:nvSpPr>
+          <p:spPr>
+            <a:xfrm>
+              <a:off x="1686517" y="4773700"/>
+              <a:ext cx="704424" cy="805416"/>
+            </a:xfrm>
+            <a:prstGeom prst="rect">
+              <a:avLst/>
+            </a:prstGeom>
+            <a:solidFill>
+              <a:srgbClr val="007396"/>
+            </a:solidFill>
+            <a:ln w="0">
+              <a:solidFill>
+                <a:srgbClr val="007396"/>
+              </a:solidFill>
+            </a:ln>
+            <a:effectLst>
+              <a:outerShdw blurRad="76200" dist="88900" dir="2700000" algn="tl" rotWithShape="0">
+                <a:prstClr val="black">
+                  <a:alpha val="40000"/>
+                </a:prstClr>
+              </a:outerShdw>
+            </a:effectLst>
+          </p:spPr>
+          <p:style>
+            <a:lnRef idx="2">
+              <a:schemeClr val="accent1">
+                <a:shade val="50000"/>
+              </a:schemeClr>
+            </a:lnRef>
+            <a:fillRef idx="1">
+              <a:schemeClr val="accent1"/>
+            </a:fillRef>
+            <a:effectRef idx="0">
+              <a:schemeClr val="accent1"/>
+            </a:effectRef>
+            <a:fontRef idx="minor">
+              <a:schemeClr val="lt1"/>
+            </a:fontRef>
+          </p:style>
+          <p:txBody>
+            <a:bodyPr lIns="0" tIns="0" rIns="0" bIns="0" rtlCol="0" anchor="ctr"/>
+            <a:lstStyle/>
+            <a:p>
+              <a:pPr algn="ctr"/>
+              <a:r>
+                <a:rPr lang="en-US" sz="7200" b="1" dirty="0">
+                  <a:latin typeface="Segoe UI" panose="020B0502040204020203" pitchFamily="34" charset="0"/>
+                  <a:cs typeface="Segoe UI" panose="020B0502040204020203" pitchFamily="34" charset="0"/>
+                </a:rPr>
+                <a:t>P</a:t>
+              </a:r>
             </a:p>
           </p:txBody>
         </p:sp>

</xml_diff>